<commit_message>
Update presentation for bus reservation system
</commit_message>
<xml_diff>
--- a/mokup/Abgabe_Busreservierungssystem.pptx
+++ b/mokup/Abgabe_Busreservierungssystem.pptx
@@ -307,7 +307,7 @@
           <a:p>
             <a:fld id="{750F0EE5-0DCA-4955-91ED-88EFE3E19334}" type="datetimeFigureOut">
               <a:rPr lang="de-DE" smtClean="0"/>
-              <a:t>17.12.2025</a:t>
+              <a:t>12.01.2026</a:t>
             </a:fld>
             <a:endParaRPr lang="de-DE"/>
           </a:p>
@@ -743,7 +743,7 @@
           <a:p>
             <a:fld id="{750F0EE5-0DCA-4955-91ED-88EFE3E19334}" type="datetimeFigureOut">
               <a:rPr lang="de-DE" smtClean="0"/>
-              <a:t>17.12.2025</a:t>
+              <a:t>12.01.2026</a:t>
             </a:fld>
             <a:endParaRPr lang="de-DE"/>
           </a:p>
@@ -993,7 +993,7 @@
           <a:p>
             <a:fld id="{750F0EE5-0DCA-4955-91ED-88EFE3E19334}" type="datetimeFigureOut">
               <a:rPr lang="de-DE" smtClean="0"/>
-              <a:t>17.12.2025</a:t>
+              <a:t>12.01.2026</a:t>
             </a:fld>
             <a:endParaRPr lang="de-DE"/>
           </a:p>
@@ -1301,7 +1301,7 @@
           <a:p>
             <a:fld id="{750F0EE5-0DCA-4955-91ED-88EFE3E19334}" type="datetimeFigureOut">
               <a:rPr lang="de-DE" smtClean="0"/>
-              <a:t>17.12.2025</a:t>
+              <a:t>12.01.2026</a:t>
             </a:fld>
             <a:endParaRPr lang="de-DE"/>
           </a:p>
@@ -1619,7 +1619,7 @@
           <a:p>
             <a:fld id="{750F0EE5-0DCA-4955-91ED-88EFE3E19334}" type="datetimeFigureOut">
               <a:rPr lang="de-DE" smtClean="0"/>
-              <a:t>17.12.2025</a:t>
+              <a:t>12.01.2026</a:t>
             </a:fld>
             <a:endParaRPr lang="de-DE"/>
           </a:p>
@@ -1921,7 +1921,7 @@
           <a:p>
             <a:fld id="{750F0EE5-0DCA-4955-91ED-88EFE3E19334}" type="datetimeFigureOut">
               <a:rPr lang="de-DE" smtClean="0"/>
-              <a:t>17.12.2025</a:t>
+              <a:t>12.01.2026</a:t>
             </a:fld>
             <a:endParaRPr lang="de-DE"/>
           </a:p>
@@ -2288,7 +2288,7 @@
           <a:p>
             <a:fld id="{750F0EE5-0DCA-4955-91ED-88EFE3E19334}" type="datetimeFigureOut">
               <a:rPr lang="de-DE" smtClean="0"/>
-              <a:t>17.12.2025</a:t>
+              <a:t>12.01.2026</a:t>
             </a:fld>
             <a:endParaRPr lang="de-DE"/>
           </a:p>
@@ -2462,7 +2462,7 @@
           <a:p>
             <a:fld id="{750F0EE5-0DCA-4955-91ED-88EFE3E19334}" type="datetimeFigureOut">
               <a:rPr lang="de-DE" smtClean="0"/>
-              <a:t>17.12.2025</a:t>
+              <a:t>12.01.2026</a:t>
             </a:fld>
             <a:endParaRPr lang="de-DE"/>
           </a:p>
@@ -2642,7 +2642,7 @@
           <a:p>
             <a:fld id="{750F0EE5-0DCA-4955-91ED-88EFE3E19334}" type="datetimeFigureOut">
               <a:rPr lang="de-DE" smtClean="0"/>
-              <a:t>17.12.2025</a:t>
+              <a:t>12.01.2026</a:t>
             </a:fld>
             <a:endParaRPr lang="de-DE"/>
           </a:p>
@@ -2812,7 +2812,7 @@
           <a:p>
             <a:fld id="{750F0EE5-0DCA-4955-91ED-88EFE3E19334}" type="datetimeFigureOut">
               <a:rPr lang="de-DE" smtClean="0"/>
-              <a:t>17.12.2025</a:t>
+              <a:t>12.01.2026</a:t>
             </a:fld>
             <a:endParaRPr lang="de-DE"/>
           </a:p>
@@ -3062,7 +3062,7 @@
           <a:p>
             <a:fld id="{750F0EE5-0DCA-4955-91ED-88EFE3E19334}" type="datetimeFigureOut">
               <a:rPr lang="de-DE" smtClean="0"/>
-              <a:t>17.12.2025</a:t>
+              <a:t>12.01.2026</a:t>
             </a:fld>
             <a:endParaRPr lang="de-DE"/>
           </a:p>
@@ -3298,7 +3298,7 @@
           <a:p>
             <a:fld id="{750F0EE5-0DCA-4955-91ED-88EFE3E19334}" type="datetimeFigureOut">
               <a:rPr lang="de-DE" smtClean="0"/>
-              <a:t>17.12.2025</a:t>
+              <a:t>12.01.2026</a:t>
             </a:fld>
             <a:endParaRPr lang="de-DE"/>
           </a:p>
@@ -3680,7 +3680,7 @@
           <a:p>
             <a:fld id="{750F0EE5-0DCA-4955-91ED-88EFE3E19334}" type="datetimeFigureOut">
               <a:rPr lang="de-DE" smtClean="0"/>
-              <a:t>17.12.2025</a:t>
+              <a:t>12.01.2026</a:t>
             </a:fld>
             <a:endParaRPr lang="de-DE"/>
           </a:p>
@@ -3798,7 +3798,7 @@
           <a:p>
             <a:fld id="{750F0EE5-0DCA-4955-91ED-88EFE3E19334}" type="datetimeFigureOut">
               <a:rPr lang="de-DE" smtClean="0"/>
-              <a:t>17.12.2025</a:t>
+              <a:t>12.01.2026</a:t>
             </a:fld>
             <a:endParaRPr lang="de-DE"/>
           </a:p>
@@ -3893,7 +3893,7 @@
           <a:p>
             <a:fld id="{750F0EE5-0DCA-4955-91ED-88EFE3E19334}" type="datetimeFigureOut">
               <a:rPr lang="de-DE" smtClean="0"/>
-              <a:t>17.12.2025</a:t>
+              <a:t>12.01.2026</a:t>
             </a:fld>
             <a:endParaRPr lang="de-DE"/>
           </a:p>
@@ -4148,7 +4148,7 @@
           <a:p>
             <a:fld id="{750F0EE5-0DCA-4955-91ED-88EFE3E19334}" type="datetimeFigureOut">
               <a:rPr lang="de-DE" smtClean="0"/>
-              <a:t>17.12.2025</a:t>
+              <a:t>12.01.2026</a:t>
             </a:fld>
             <a:endParaRPr lang="de-DE"/>
           </a:p>
@@ -4431,7 +4431,7 @@
           <a:p>
             <a:fld id="{750F0EE5-0DCA-4955-91ED-88EFE3E19334}" type="datetimeFigureOut">
               <a:rPr lang="de-DE" smtClean="0"/>
-              <a:t>17.12.2025</a:t>
+              <a:t>12.01.2026</a:t>
             </a:fld>
             <a:endParaRPr lang="de-DE"/>
           </a:p>
@@ -4837,7 +4837,7 @@
           <a:p>
             <a:fld id="{750F0EE5-0DCA-4955-91ED-88EFE3E19334}" type="datetimeFigureOut">
               <a:rPr lang="de-DE" smtClean="0"/>
-              <a:t>17.12.2025</a:t>
+              <a:t>12.01.2026</a:t>
             </a:fld>
             <a:endParaRPr lang="de-DE"/>
           </a:p>
@@ -8653,6 +8653,17 @@
               </a:spcAft>
             </a:pPr>
             <a:r>
+              <a:rPr lang="de-DE" sz="4800" cap="all" noProof="0" dirty="0" err="1">
+                <a:ln w="3175" cmpd="sng">
+                  <a:noFill/>
+                </a:ln>
+                <a:latin typeface="+mj-lt"/>
+                <a:ea typeface="+mj-ea"/>
+                <a:cs typeface="+mj-cs"/>
+              </a:rPr>
+              <a:t>Lessons</a:t>
+            </a:r>
+            <a:r>
               <a:rPr lang="de-DE" sz="4800" cap="all" noProof="0" dirty="0">
                 <a:ln w="3175" cmpd="sng">
                   <a:noFill/>
@@ -8661,8 +8672,27 @@
                 <a:ea typeface="+mj-ea"/>
                 <a:cs typeface="+mj-cs"/>
               </a:rPr>
-              <a:t>Fazit</a:t>
-            </a:r>
+              <a:t> </a:t>
+            </a:r>
+            <a:r>
+              <a:rPr lang="de-DE" sz="4800" cap="all" noProof="0" dirty="0" err="1">
+                <a:ln w="3175" cmpd="sng">
+                  <a:noFill/>
+                </a:ln>
+                <a:latin typeface="+mj-lt"/>
+                <a:ea typeface="+mj-ea"/>
+                <a:cs typeface="+mj-cs"/>
+              </a:rPr>
+              <a:t>Learned</a:t>
+            </a:r>
+            <a:endParaRPr lang="de-DE" sz="4800" cap="all" noProof="0" dirty="0">
+              <a:ln w="3175" cmpd="sng">
+                <a:noFill/>
+              </a:ln>
+              <a:latin typeface="+mj-lt"/>
+              <a:ea typeface="+mj-ea"/>
+              <a:cs typeface="+mj-cs"/>
+            </a:endParaRPr>
           </a:p>
         </p:txBody>
       </p:sp>
@@ -8689,9 +8719,39 @@
         </p:spPr>
         <p:txBody>
           <a:bodyPr vert="horz" lIns="91440" tIns="45720" rIns="91440" bIns="45720" rtlCol="0" anchor="t">
-            <a:normAutofit/>
+            <a:normAutofit fontScale="92500"/>
           </a:bodyPr>
           <a:lstStyle/>
+          <a:p>
+            <a:pPr>
+              <a:spcBef>
+                <a:spcPct val="20000"/>
+              </a:spcBef>
+              <a:spcAft>
+                <a:spcPts val="600"/>
+              </a:spcAft>
+              <a:buClr>
+                <a:schemeClr val="tx1"/>
+              </a:buClr>
+              <a:buSzPct val="80000"/>
+            </a:pPr>
+            <a:endParaRPr lang="de-DE" sz="2100" b="1" noProof="0" dirty="0"/>
+          </a:p>
+          <a:p>
+            <a:pPr>
+              <a:spcBef>
+                <a:spcPct val="20000"/>
+              </a:spcBef>
+              <a:spcAft>
+                <a:spcPts val="600"/>
+              </a:spcAft>
+              <a:buClr>
+                <a:schemeClr val="tx1"/>
+              </a:buClr>
+              <a:buSzPct val="80000"/>
+            </a:pPr>
+            <a:endParaRPr lang="de-DE" sz="2100" b="1" dirty="0"/>
+          </a:p>
           <a:p>
             <a:pPr>
               <a:spcBef>
@@ -9141,6 +9201,251 @@
               <a:rPr lang="de-DE" noProof="0" dirty="0"/>
               <a:t>Projektziel wurde mit Umsetzung der User Storys erreicht</a:t>
             </a:r>
+          </a:p>
+        </p:txBody>
+      </p:sp>
+      <p:sp>
+        <p:nvSpPr>
+          <p:cNvPr id="3" name="Textfeld 2">
+            <a:extLst>
+              <a:ext uri="{FF2B5EF4-FFF2-40B4-BE49-F238E27FC236}">
+                <a16:creationId xmlns:a16="http://schemas.microsoft.com/office/drawing/2014/main" id="{3CC4810A-BADA-A0AA-143E-B23A286DC689}"/>
+              </a:ext>
+            </a:extLst>
+          </p:cNvPr>
+          <p:cNvSpPr txBox="1"/>
+          <p:nvPr/>
+        </p:nvSpPr>
+        <p:spPr>
+          <a:xfrm>
+            <a:off x="7405687" y="1747106"/>
+            <a:ext cx="4343399" cy="4425094"/>
+          </a:xfrm>
+          <a:prstGeom prst="rect">
+            <a:avLst/>
+          </a:prstGeom>
+        </p:spPr>
+        <p:txBody>
+          <a:bodyPr vert="horz" lIns="91440" tIns="45720" rIns="91440" bIns="45720" rtlCol="0" anchor="t">
+            <a:normAutofit lnSpcReduction="10000"/>
+          </a:bodyPr>
+          <a:lstStyle/>
+          <a:p>
+            <a:pPr>
+              <a:spcBef>
+                <a:spcPct val="20000"/>
+              </a:spcBef>
+              <a:spcAft>
+                <a:spcPts val="600"/>
+              </a:spcAft>
+              <a:buClr>
+                <a:schemeClr val="tx1"/>
+              </a:buClr>
+              <a:buSzPct val="80000"/>
+            </a:pPr>
+            <a:r>
+              <a:rPr lang="de-DE" sz="2100" b="1" noProof="0" dirty="0"/>
+              <a:t>Docker:</a:t>
+            </a:r>
+          </a:p>
+          <a:p>
+            <a:pPr>
+              <a:spcBef>
+                <a:spcPct val="20000"/>
+              </a:spcBef>
+              <a:spcAft>
+                <a:spcPts val="600"/>
+              </a:spcAft>
+              <a:buClr>
+                <a:schemeClr val="tx1"/>
+              </a:buClr>
+              <a:buSzPct val="80000"/>
+            </a:pPr>
+            <a:r>
+              <a:rPr lang="de-DE" sz="1700" dirty="0"/>
+              <a:t>Aufsetzen eines Containers</a:t>
+            </a:r>
+            <a:endParaRPr lang="de-DE" sz="1700" noProof="0" dirty="0"/>
+          </a:p>
+          <a:p>
+            <a:pPr>
+              <a:spcBef>
+                <a:spcPct val="20000"/>
+              </a:spcBef>
+              <a:spcAft>
+                <a:spcPts val="600"/>
+              </a:spcAft>
+              <a:buClr>
+                <a:schemeClr val="tx1"/>
+              </a:buClr>
+              <a:buSzPct val="80000"/>
+            </a:pPr>
+            <a:endParaRPr lang="de-DE" sz="2100" b="1" dirty="0"/>
+          </a:p>
+          <a:p>
+            <a:pPr>
+              <a:spcBef>
+                <a:spcPct val="20000"/>
+              </a:spcBef>
+              <a:spcAft>
+                <a:spcPts val="600"/>
+              </a:spcAft>
+              <a:buClr>
+                <a:schemeClr val="tx1"/>
+              </a:buClr>
+              <a:buSzPct val="80000"/>
+            </a:pPr>
+            <a:r>
+              <a:rPr lang="de-DE" sz="2100" b="1" noProof="0" dirty="0" err="1"/>
+              <a:t>Nginx</a:t>
+            </a:r>
+            <a:r>
+              <a:rPr lang="de-DE" sz="2100" b="1" noProof="0" dirty="0"/>
+              <a:t>:</a:t>
+            </a:r>
+          </a:p>
+          <a:p>
+            <a:pPr>
+              <a:spcBef>
+                <a:spcPct val="20000"/>
+              </a:spcBef>
+              <a:spcAft>
+                <a:spcPts val="600"/>
+              </a:spcAft>
+              <a:buClr>
+                <a:schemeClr val="tx1"/>
+              </a:buClr>
+              <a:buSzPct val="80000"/>
+            </a:pPr>
+            <a:r>
+              <a:rPr lang="de-DE" sz="1600" noProof="0" dirty="0" err="1"/>
+              <a:t>Konfig</a:t>
+            </a:r>
+            <a:r>
+              <a:rPr lang="de-DE" sz="1600" noProof="0" dirty="0"/>
+              <a:t> und Umsetzen von Server</a:t>
+            </a:r>
+          </a:p>
+          <a:p>
+            <a:pPr>
+              <a:spcBef>
+                <a:spcPct val="20000"/>
+              </a:spcBef>
+              <a:spcAft>
+                <a:spcPts val="600"/>
+              </a:spcAft>
+              <a:buClr>
+                <a:schemeClr val="tx1"/>
+              </a:buClr>
+              <a:buSzPct val="80000"/>
+            </a:pPr>
+            <a:endParaRPr lang="de-DE" sz="1600" dirty="0"/>
+          </a:p>
+          <a:p>
+            <a:pPr>
+              <a:spcBef>
+                <a:spcPct val="20000"/>
+              </a:spcBef>
+              <a:spcAft>
+                <a:spcPts val="600"/>
+              </a:spcAft>
+              <a:buClr>
+                <a:schemeClr val="tx1"/>
+              </a:buClr>
+              <a:buSzPct val="80000"/>
+            </a:pPr>
+            <a:r>
+              <a:rPr lang="de-DE" sz="1600" noProof="0" dirty="0"/>
+              <a:t>Frontend / HTML / JavaScript / CSS</a:t>
+            </a:r>
+          </a:p>
+          <a:p>
+            <a:pPr>
+              <a:spcBef>
+                <a:spcPct val="20000"/>
+              </a:spcBef>
+              <a:spcAft>
+                <a:spcPts val="600"/>
+              </a:spcAft>
+              <a:buClr>
+                <a:schemeClr val="tx1"/>
+              </a:buClr>
+              <a:buSzPct val="80000"/>
+            </a:pPr>
+            <a:endParaRPr lang="de-DE" sz="1600" noProof="0" dirty="0"/>
+          </a:p>
+          <a:p>
+            <a:pPr>
+              <a:spcBef>
+                <a:spcPct val="20000"/>
+              </a:spcBef>
+              <a:spcAft>
+                <a:spcPts val="600"/>
+              </a:spcAft>
+              <a:buClr>
+                <a:schemeClr val="tx1"/>
+              </a:buClr>
+              <a:buSzPct val="80000"/>
+            </a:pPr>
+            <a:r>
+              <a:rPr lang="de-DE" sz="2400" b="1" dirty="0"/>
+              <a:t>Team:</a:t>
+            </a:r>
+          </a:p>
+          <a:p>
+            <a:pPr>
+              <a:spcBef>
+                <a:spcPct val="20000"/>
+              </a:spcBef>
+              <a:spcAft>
+                <a:spcPts val="600"/>
+              </a:spcAft>
+              <a:buClr>
+                <a:schemeClr val="tx1"/>
+              </a:buClr>
+              <a:buSzPct val="80000"/>
+            </a:pPr>
+            <a:r>
+              <a:rPr lang="de-DE" sz="1600" noProof="0" dirty="0"/>
+              <a:t>Absprache</a:t>
+            </a:r>
+          </a:p>
+          <a:p>
+            <a:pPr>
+              <a:spcBef>
+                <a:spcPct val="20000"/>
+              </a:spcBef>
+              <a:spcAft>
+                <a:spcPts val="600"/>
+              </a:spcAft>
+              <a:buClr>
+                <a:schemeClr val="tx1"/>
+              </a:buClr>
+              <a:buSzPct val="80000"/>
+            </a:pPr>
+            <a:r>
+              <a:rPr lang="de-DE" sz="1600" noProof="0"/>
+              <a:t>Aufsetzen einer </a:t>
+            </a:r>
+            <a:r>
+              <a:rPr lang="de-DE" sz="1600" noProof="0" dirty="0"/>
+              <a:t>Datenbank.</a:t>
+            </a:r>
+          </a:p>
+          <a:p>
+            <a:pPr>
+              <a:spcBef>
+                <a:spcPct val="20000"/>
+              </a:spcBef>
+              <a:spcAft>
+                <a:spcPts val="600"/>
+              </a:spcAft>
+              <a:buClr>
+                <a:schemeClr val="tx1"/>
+              </a:buClr>
+              <a:buSzPct val="80000"/>
+            </a:pPr>
+            <a:endParaRPr lang="de-DE" sz="2100" b="1" noProof="0" dirty="0"/>
           </a:p>
         </p:txBody>
       </p:sp>

</xml_diff>

<commit_message>
update pptx, edit lesson learned
</commit_message>
<xml_diff>
--- a/mokup/Abgabe_Busreservierungssystem.pptx
+++ b/mokup/Abgabe_Busreservierungssystem.pptx
@@ -307,7 +307,7 @@
           <a:p>
             <a:fld id="{750F0EE5-0DCA-4955-91ED-88EFE3E19334}" type="datetimeFigureOut">
               <a:rPr lang="de-DE" smtClean="0"/>
-              <a:t>12.01.2026</a:t>
+              <a:t>18.01.2026</a:t>
             </a:fld>
             <a:endParaRPr lang="de-DE"/>
           </a:p>
@@ -743,7 +743,7 @@
           <a:p>
             <a:fld id="{750F0EE5-0DCA-4955-91ED-88EFE3E19334}" type="datetimeFigureOut">
               <a:rPr lang="de-DE" smtClean="0"/>
-              <a:t>12.01.2026</a:t>
+              <a:t>18.01.2026</a:t>
             </a:fld>
             <a:endParaRPr lang="de-DE"/>
           </a:p>
@@ -993,7 +993,7 @@
           <a:p>
             <a:fld id="{750F0EE5-0DCA-4955-91ED-88EFE3E19334}" type="datetimeFigureOut">
               <a:rPr lang="de-DE" smtClean="0"/>
-              <a:t>12.01.2026</a:t>
+              <a:t>18.01.2026</a:t>
             </a:fld>
             <a:endParaRPr lang="de-DE"/>
           </a:p>
@@ -1301,7 +1301,7 @@
           <a:p>
             <a:fld id="{750F0EE5-0DCA-4955-91ED-88EFE3E19334}" type="datetimeFigureOut">
               <a:rPr lang="de-DE" smtClean="0"/>
-              <a:t>12.01.2026</a:t>
+              <a:t>18.01.2026</a:t>
             </a:fld>
             <a:endParaRPr lang="de-DE"/>
           </a:p>
@@ -1619,7 +1619,7 @@
           <a:p>
             <a:fld id="{750F0EE5-0DCA-4955-91ED-88EFE3E19334}" type="datetimeFigureOut">
               <a:rPr lang="de-DE" smtClean="0"/>
-              <a:t>12.01.2026</a:t>
+              <a:t>18.01.2026</a:t>
             </a:fld>
             <a:endParaRPr lang="de-DE"/>
           </a:p>
@@ -1921,7 +1921,7 @@
           <a:p>
             <a:fld id="{750F0EE5-0DCA-4955-91ED-88EFE3E19334}" type="datetimeFigureOut">
               <a:rPr lang="de-DE" smtClean="0"/>
-              <a:t>12.01.2026</a:t>
+              <a:t>18.01.2026</a:t>
             </a:fld>
             <a:endParaRPr lang="de-DE"/>
           </a:p>
@@ -2288,7 +2288,7 @@
           <a:p>
             <a:fld id="{750F0EE5-0DCA-4955-91ED-88EFE3E19334}" type="datetimeFigureOut">
               <a:rPr lang="de-DE" smtClean="0"/>
-              <a:t>12.01.2026</a:t>
+              <a:t>18.01.2026</a:t>
             </a:fld>
             <a:endParaRPr lang="de-DE"/>
           </a:p>
@@ -2462,7 +2462,7 @@
           <a:p>
             <a:fld id="{750F0EE5-0DCA-4955-91ED-88EFE3E19334}" type="datetimeFigureOut">
               <a:rPr lang="de-DE" smtClean="0"/>
-              <a:t>12.01.2026</a:t>
+              <a:t>18.01.2026</a:t>
             </a:fld>
             <a:endParaRPr lang="de-DE"/>
           </a:p>
@@ -2642,7 +2642,7 @@
           <a:p>
             <a:fld id="{750F0EE5-0DCA-4955-91ED-88EFE3E19334}" type="datetimeFigureOut">
               <a:rPr lang="de-DE" smtClean="0"/>
-              <a:t>12.01.2026</a:t>
+              <a:t>18.01.2026</a:t>
             </a:fld>
             <a:endParaRPr lang="de-DE"/>
           </a:p>
@@ -2812,7 +2812,7 @@
           <a:p>
             <a:fld id="{750F0EE5-0DCA-4955-91ED-88EFE3E19334}" type="datetimeFigureOut">
               <a:rPr lang="de-DE" smtClean="0"/>
-              <a:t>12.01.2026</a:t>
+              <a:t>18.01.2026</a:t>
             </a:fld>
             <a:endParaRPr lang="de-DE"/>
           </a:p>
@@ -3062,7 +3062,7 @@
           <a:p>
             <a:fld id="{750F0EE5-0DCA-4955-91ED-88EFE3E19334}" type="datetimeFigureOut">
               <a:rPr lang="de-DE" smtClean="0"/>
-              <a:t>12.01.2026</a:t>
+              <a:t>18.01.2026</a:t>
             </a:fld>
             <a:endParaRPr lang="de-DE"/>
           </a:p>
@@ -3298,7 +3298,7 @@
           <a:p>
             <a:fld id="{750F0EE5-0DCA-4955-91ED-88EFE3E19334}" type="datetimeFigureOut">
               <a:rPr lang="de-DE" smtClean="0"/>
-              <a:t>12.01.2026</a:t>
+              <a:t>18.01.2026</a:t>
             </a:fld>
             <a:endParaRPr lang="de-DE"/>
           </a:p>
@@ -3680,7 +3680,7 @@
           <a:p>
             <a:fld id="{750F0EE5-0DCA-4955-91ED-88EFE3E19334}" type="datetimeFigureOut">
               <a:rPr lang="de-DE" smtClean="0"/>
-              <a:t>12.01.2026</a:t>
+              <a:t>18.01.2026</a:t>
             </a:fld>
             <a:endParaRPr lang="de-DE"/>
           </a:p>
@@ -3798,7 +3798,7 @@
           <a:p>
             <a:fld id="{750F0EE5-0DCA-4955-91ED-88EFE3E19334}" type="datetimeFigureOut">
               <a:rPr lang="de-DE" smtClean="0"/>
-              <a:t>12.01.2026</a:t>
+              <a:t>18.01.2026</a:t>
             </a:fld>
             <a:endParaRPr lang="de-DE"/>
           </a:p>
@@ -3893,7 +3893,7 @@
           <a:p>
             <a:fld id="{750F0EE5-0DCA-4955-91ED-88EFE3E19334}" type="datetimeFigureOut">
               <a:rPr lang="de-DE" smtClean="0"/>
-              <a:t>12.01.2026</a:t>
+              <a:t>18.01.2026</a:t>
             </a:fld>
             <a:endParaRPr lang="de-DE"/>
           </a:p>
@@ -4148,7 +4148,7 @@
           <a:p>
             <a:fld id="{750F0EE5-0DCA-4955-91ED-88EFE3E19334}" type="datetimeFigureOut">
               <a:rPr lang="de-DE" smtClean="0"/>
-              <a:t>12.01.2026</a:t>
+              <a:t>18.01.2026</a:t>
             </a:fld>
             <a:endParaRPr lang="de-DE"/>
           </a:p>
@@ -4431,7 +4431,7 @@
           <a:p>
             <a:fld id="{750F0EE5-0DCA-4955-91ED-88EFE3E19334}" type="datetimeFigureOut">
               <a:rPr lang="de-DE" smtClean="0"/>
-              <a:t>12.01.2026</a:t>
+              <a:t>18.01.2026</a:t>
             </a:fld>
             <a:endParaRPr lang="de-DE"/>
           </a:p>
@@ -4837,7 +4837,7 @@
           <a:p>
             <a:fld id="{750F0EE5-0DCA-4955-91ED-88EFE3E19334}" type="datetimeFigureOut">
               <a:rPr lang="de-DE" smtClean="0"/>
-              <a:t>12.01.2026</a:t>
+              <a:t>18.01.2026</a:t>
             </a:fld>
             <a:endParaRPr lang="de-DE"/>
           </a:p>
@@ -5771,7 +5771,7 @@
         </p:nvSpPr>
         <p:spPr>
           <a:xfrm>
-            <a:off x="828675" y="3044279"/>
+            <a:off x="828675" y="3162266"/>
             <a:ext cx="5029200" cy="769441"/>
           </a:xfrm>
           <a:prstGeom prst="rect">
@@ -5826,7 +5826,7 @@
             </a:pPr>
             <a:r>
               <a:rPr lang="de-DE" sz="1400" noProof="0" dirty="0"/>
-              <a:t>Anmeldung/Registrieren eines Users</a:t>
+              <a:t>Anmeldung / Registrieren eines Users</a:t>
             </a:r>
           </a:p>
           <a:p>
@@ -5836,7 +5836,7 @@
             </a:pPr>
             <a:r>
               <a:rPr lang="de-DE" sz="1400" noProof="0" dirty="0"/>
-              <a:t>Anmeldung als Admin, Admin kann die Ausflüge einstellen, sowie eine automatische Anfrage (Mail) an diverse Bus-Unternehmen versenden </a:t>
+              <a:t>Anmeldung als Admin, Admin kann die Ausflüge einstellen, sowie eine Anfrage (Mail) an diverse Bus-Unternehmen versenden </a:t>
             </a:r>
           </a:p>
           <a:p>
@@ -5846,7 +5846,7 @@
             </a:pPr>
             <a:r>
               <a:rPr lang="de-DE" sz="1400" noProof="0" dirty="0"/>
-              <a:t>Sitzplatz reservieren/stornieren</a:t>
+              <a:t>Sitzplatz reservieren / stornieren</a:t>
             </a:r>
             <a:br>
               <a:rPr lang="de-DE" sz="1400" noProof="0" dirty="0"/>
@@ -6247,7 +6247,7 @@
                   <a:srgbClr val="FFFFFF"/>
                 </a:solidFill>
               </a:rPr>
-              <a:t>User-Storys</a:t>
+              <a:t>Ziele</a:t>
             </a:r>
           </a:p>
         </p:txBody>
@@ -6619,14 +6619,14 @@
           <p:nvPr>
             <p:extLst>
               <p:ext uri="{D42A27DB-BD31-4B8C-83A1-F6EECF244321}">
-                <p14:modId xmlns:p14="http://schemas.microsoft.com/office/powerpoint/2010/main" val="3919998576"/>
+                <p14:modId xmlns:p14="http://schemas.microsoft.com/office/powerpoint/2010/main" val="1534809825"/>
               </p:ext>
             </p:extLst>
           </p:nvPr>
         </p:nvGraphicFramePr>
         <p:xfrm>
-          <a:off x="1101217" y="1631288"/>
-          <a:ext cx="5450438" cy="3542459"/>
+          <a:off x="845917" y="1274772"/>
+          <a:ext cx="5956519" cy="3985485"/>
         </p:xfrm>
         <a:graphic>
           <a:graphicData uri="http://schemas.openxmlformats.org/drawingml/2006/table">
@@ -6635,21 +6635,21 @@
                 <a:noFill/>
               </a:tblPr>
               <a:tblGrid>
-                <a:gridCol w="525763">
+                <a:gridCol w="574581">
                   <a:extLst>
                     <a:ext uri="{9D8B030D-6E8A-4147-A177-3AD203B41FA5}">
                       <a16:colId xmlns:a16="http://schemas.microsoft.com/office/drawing/2014/main" val="4173582292"/>
                     </a:ext>
                   </a:extLst>
                 </a:gridCol>
-                <a:gridCol w="2012238">
+                <a:gridCol w="2199077">
                   <a:extLst>
                     <a:ext uri="{9D8B030D-6E8A-4147-A177-3AD203B41FA5}">
                       <a16:colId xmlns:a16="http://schemas.microsoft.com/office/drawing/2014/main" val="1723992326"/>
                     </a:ext>
                   </a:extLst>
                 </a:gridCol>
-                <a:gridCol w="2912437">
+                <a:gridCol w="3182861">
                   <a:extLst>
                     <a:ext uri="{9D8B030D-6E8A-4147-A177-3AD203B41FA5}">
                       <a16:colId xmlns:a16="http://schemas.microsoft.com/office/drawing/2014/main" val="1347948892"/>
@@ -6657,7 +6657,7 @@
                   </a:extLst>
                 </a:gridCol>
               </a:tblGrid>
-              <a:tr h="256851">
+              <a:tr h="300609">
                 <a:tc>
                   <a:txBody>
                     <a:bodyPr/>
@@ -6766,7 +6766,7 @@
                   </a:ext>
                 </a:extLst>
               </a:tr>
-              <a:tr h="234833">
+              <a:tr h="274840">
                 <a:tc>
                   <a:txBody>
                     <a:bodyPr/>
@@ -6908,7 +6908,7 @@
                   </a:ext>
                 </a:extLst>
               </a:tr>
-              <a:tr h="399965">
+              <a:tr h="631521">
                 <a:tc>
                   <a:txBody>
                     <a:bodyPr/>
@@ -7032,7 +7032,7 @@
                   </a:ext>
                 </a:extLst>
               </a:tr>
-              <a:tr h="234833">
+              <a:tr h="274840">
                 <a:tc>
                   <a:txBody>
                     <a:bodyPr/>
@@ -7156,7 +7156,7 @@
                   </a:ext>
                 </a:extLst>
               </a:tr>
-              <a:tr h="399965">
+              <a:tr h="468105">
                 <a:tc>
                   <a:txBody>
                     <a:bodyPr/>
@@ -7280,7 +7280,7 @@
                   </a:ext>
                 </a:extLst>
               </a:tr>
-              <a:tr h="234833">
+              <a:tr h="274840">
                 <a:tc>
                   <a:txBody>
                     <a:bodyPr/>
@@ -7404,7 +7404,7 @@
                   </a:ext>
                 </a:extLst>
               </a:tr>
-              <a:tr h="399965">
+              <a:tr h="468105">
                 <a:tc>
                   <a:txBody>
                     <a:bodyPr/>
@@ -7459,7 +7459,7 @@
                           </a:solidFill>
                           <a:effectLst/>
                         </a:rPr>
-                        <a:t>Automatische Mail an Busunternehmen senden</a:t>
+                        <a:t>Mail an Busunternehmen senden</a:t>
                       </a:r>
                     </a:p>
                   </a:txBody>
@@ -7528,7 +7528,7 @@
                   </a:ext>
                 </a:extLst>
               </a:tr>
-              <a:tr h="234833">
+              <a:tr h="274840">
                 <a:tc>
                   <a:txBody>
                     <a:bodyPr/>
@@ -7652,7 +7652,7 @@
                   </a:ext>
                 </a:extLst>
               </a:tr>
-              <a:tr h="234833">
+              <a:tr h="274840">
                 <a:tc>
                   <a:txBody>
                     <a:bodyPr/>
@@ -7776,7 +7776,7 @@
                   </a:ext>
                 </a:extLst>
               </a:tr>
-              <a:tr h="399965">
+              <a:tr h="468105">
                 <a:tc>
                   <a:txBody>
                     <a:bodyPr/>
@@ -7900,7 +7900,7 @@
                   </a:ext>
                 </a:extLst>
               </a:tr>
-              <a:tr h="234833">
+              <a:tr h="274840">
                 <a:tc>
                   <a:txBody>
                     <a:bodyPr/>
@@ -8631,8 +8631,8 @@
         </p:nvSpPr>
         <p:spPr>
           <a:xfrm>
-            <a:off x="684212" y="685799"/>
-            <a:ext cx="8001000" cy="2971801"/>
+            <a:off x="647719" y="286739"/>
+            <a:ext cx="8001000" cy="1026044"/>
           </a:xfrm>
           <a:prstGeom prst="rect">
             <a:avLst/>
@@ -8693,100 +8693,6 @@
               <a:ea typeface="+mj-ea"/>
               <a:cs typeface="+mj-cs"/>
             </a:endParaRPr>
-          </a:p>
-        </p:txBody>
-      </p:sp>
-      <p:sp>
-        <p:nvSpPr>
-          <p:cNvPr id="17" name="Textfeld 16">
-            <a:extLst>
-              <a:ext uri="{FF2B5EF4-FFF2-40B4-BE49-F238E27FC236}">
-                <a16:creationId xmlns:a16="http://schemas.microsoft.com/office/drawing/2014/main" id="{B92C183A-6328-891E-A98F-8EAB44A40FBC}"/>
-              </a:ext>
-            </a:extLst>
-          </p:cNvPr>
-          <p:cNvSpPr txBox="1"/>
-          <p:nvPr/>
-        </p:nvSpPr>
-        <p:spPr>
-          <a:xfrm>
-            <a:off x="684212" y="3843867"/>
-            <a:ext cx="6400800" cy="1947333"/>
-          </a:xfrm>
-          <a:prstGeom prst="rect">
-            <a:avLst/>
-          </a:prstGeom>
-        </p:spPr>
-        <p:txBody>
-          <a:bodyPr vert="horz" lIns="91440" tIns="45720" rIns="91440" bIns="45720" rtlCol="0" anchor="t">
-            <a:normAutofit fontScale="92500"/>
-          </a:bodyPr>
-          <a:lstStyle/>
-          <a:p>
-            <a:pPr>
-              <a:spcBef>
-                <a:spcPct val="20000"/>
-              </a:spcBef>
-              <a:spcAft>
-                <a:spcPts val="600"/>
-              </a:spcAft>
-              <a:buClr>
-                <a:schemeClr val="tx1"/>
-              </a:buClr>
-              <a:buSzPct val="80000"/>
-            </a:pPr>
-            <a:endParaRPr lang="de-DE" sz="2100" b="1" noProof="0" dirty="0"/>
-          </a:p>
-          <a:p>
-            <a:pPr>
-              <a:spcBef>
-                <a:spcPct val="20000"/>
-              </a:spcBef>
-              <a:spcAft>
-                <a:spcPts val="600"/>
-              </a:spcAft>
-              <a:buClr>
-                <a:schemeClr val="tx1"/>
-              </a:buClr>
-              <a:buSzPct val="80000"/>
-            </a:pPr>
-            <a:endParaRPr lang="de-DE" sz="2100" b="1" dirty="0"/>
-          </a:p>
-          <a:p>
-            <a:pPr>
-              <a:spcBef>
-                <a:spcPct val="20000"/>
-              </a:spcBef>
-              <a:spcAft>
-                <a:spcPts val="600"/>
-              </a:spcAft>
-              <a:buClr>
-                <a:schemeClr val="tx1"/>
-              </a:buClr>
-              <a:buSzPct val="80000"/>
-            </a:pPr>
-            <a:r>
-              <a:rPr lang="de-DE" sz="2100" b="1" noProof="0" dirty="0"/>
-              <a:t>Zukunftsfähig?</a:t>
-            </a:r>
-          </a:p>
-          <a:p>
-            <a:pPr>
-              <a:spcBef>
-                <a:spcPct val="20000"/>
-              </a:spcBef>
-              <a:spcAft>
-                <a:spcPts val="600"/>
-              </a:spcAft>
-              <a:buClr>
-                <a:schemeClr val="tx1"/>
-              </a:buClr>
-              <a:buSzPct val="80000"/>
-            </a:pPr>
-            <a:r>
-              <a:rPr lang="de-DE" sz="2100" noProof="0" dirty="0"/>
-              <a:t>In den ersten Tests hatte sich gezeigt, dass die Anwendung potential für den Realbetrieb hat. </a:t>
-            </a:r>
           </a:p>
         </p:txBody>
       </p:sp>
@@ -9086,7 +8992,7 @@
         </p:nvSpPr>
         <p:spPr>
           <a:xfrm>
-            <a:off x="5215221" y="797442"/>
+            <a:off x="5212046" y="797442"/>
             <a:ext cx="5133408" cy="914401"/>
           </a:xfrm>
           <a:prstGeom prst="rect">
@@ -9160,292 +9066,520 @@
       </p:sp>
       <p:sp>
         <p:nvSpPr>
-          <p:cNvPr id="10" name="Textfeld 9">
+          <p:cNvPr id="18" name="Rectangle 9">
             <a:extLst>
               <a:ext uri="{FF2B5EF4-FFF2-40B4-BE49-F238E27FC236}">
-                <a16:creationId xmlns:a16="http://schemas.microsoft.com/office/drawing/2014/main" id="{18E77ED0-F9D9-430B-BCBD-74A6F64FAF27}"/>
+                <a16:creationId xmlns:a16="http://schemas.microsoft.com/office/drawing/2014/main" id="{D4468DA8-1775-0221-3717-F35032018FCE}"/>
               </a:ext>
             </a:extLst>
           </p:cNvPr>
-          <p:cNvSpPr txBox="1"/>
+          <p:cNvSpPr>
+            <a:spLocks noChangeArrowheads="1"/>
+          </p:cNvSpPr>
           <p:nvPr/>
         </p:nvSpPr>
-        <p:spPr>
+        <p:spPr bwMode="auto">
           <a:xfrm>
-            <a:off x="684212" y="1234537"/>
-            <a:ext cx="7053775" cy="1216556"/>
+            <a:off x="782563" y="1786385"/>
+            <a:ext cx="10160740" cy="4524315"/>
           </a:xfrm>
           <a:prstGeom prst="rect">
             <a:avLst/>
           </a:prstGeom>
+          <a:noFill/>
+          <a:ln>
+            <a:noFill/>
+          </a:ln>
+          <a:effectLst/>
+          <a:extLst>
+            <a:ext uri="{909E8E84-426E-40DD-AFC4-6F175D3DCCD1}">
+              <a14:hiddenFill xmlns:a14="http://schemas.microsoft.com/office/drawing/2010/main">
+                <a:solidFill>
+                  <a:schemeClr val="accent1"/>
+                </a:solidFill>
+              </a14:hiddenFill>
+            </a:ext>
+            <a:ext uri="{91240B29-F687-4F45-9708-019B960494DF}">
+              <a14:hiddenLine xmlns:a14="http://schemas.microsoft.com/office/drawing/2010/main" w="9525">
+                <a:solidFill>
+                  <a:schemeClr val="tx1"/>
+                </a:solidFill>
+                <a:miter lim="800000"/>
+                <a:headEnd/>
+                <a:tailEnd/>
+              </a14:hiddenLine>
+            </a:ext>
+            <a:ext uri="{AF507438-7753-43E0-B8FC-AC1667EBCBE1}">
+              <a14:hiddenEffects xmlns:a14="http://schemas.microsoft.com/office/drawing/2010/main">
+                <a:effectLst>
+                  <a:outerShdw dist="35921" dir="2700000" algn="ctr" rotWithShape="0">
+                    <a:schemeClr val="bg2"/>
+                  </a:outerShdw>
+                </a:effectLst>
+              </a14:hiddenEffects>
+            </a:ext>
+          </a:extLst>
         </p:spPr>
         <p:txBody>
-          <a:bodyPr vert="horz" lIns="91440" tIns="45720" rIns="91440" bIns="45720" rtlCol="0" anchor="ctr">
-            <a:normAutofit/>
+          <a:bodyPr vert="horz" wrap="square" lIns="91440" tIns="45720" rIns="91440" bIns="45720" numCol="1" anchor="ctr" anchorCtr="0" compatLnSpc="1">
+            <a:prstTxWarp prst="textNoShape">
+              <a:avLst/>
+            </a:prstTxWarp>
+            <a:spAutoFit/>
           </a:bodyPr>
           <a:lstStyle/>
           <a:p>
-            <a:pPr>
+            <a:pPr marL="0" marR="0" lvl="0" indent="0" algn="l" defTabSz="914400" rtl="0" eaLnBrk="0" fontAlgn="base" latinLnBrk="0" hangingPunct="0">
+              <a:lnSpc>
+                <a:spcPct val="100000"/>
+              </a:lnSpc>
               <a:spcBef>
-                <a:spcPct val="20000"/>
+                <a:spcPct val="0"/>
               </a:spcBef>
               <a:spcAft>
-                <a:spcPts val="600"/>
+                <a:spcPct val="0"/>
               </a:spcAft>
-              <a:buClr>
-                <a:schemeClr val="tx1"/>
-              </a:buClr>
-              <a:buSzPct val="80000"/>
+              <a:buClrTx/>
+              <a:buSzTx/>
+              <a:tabLst/>
             </a:pPr>
             <a:r>
-              <a:rPr lang="de-DE" noProof="0" dirty="0"/>
-              <a:t>Projektziel wurde mit Umsetzung der User Storys erreicht</a:t>
-            </a:r>
-          </a:p>
-        </p:txBody>
-      </p:sp>
-      <p:sp>
-        <p:nvSpPr>
-          <p:cNvPr id="3" name="Textfeld 2">
-            <a:extLst>
-              <a:ext uri="{FF2B5EF4-FFF2-40B4-BE49-F238E27FC236}">
-                <a16:creationId xmlns:a16="http://schemas.microsoft.com/office/drawing/2014/main" id="{3CC4810A-BADA-A0AA-143E-B23A286DC689}"/>
-              </a:ext>
-            </a:extLst>
-          </p:cNvPr>
-          <p:cNvSpPr txBox="1"/>
-          <p:nvPr/>
-        </p:nvSpPr>
-        <p:spPr>
-          <a:xfrm>
-            <a:off x="7405687" y="1747106"/>
-            <a:ext cx="4343399" cy="4425094"/>
-          </a:xfrm>
-          <a:prstGeom prst="rect">
-            <a:avLst/>
-          </a:prstGeom>
-        </p:spPr>
-        <p:txBody>
-          <a:bodyPr vert="horz" lIns="91440" tIns="45720" rIns="91440" bIns="45720" rtlCol="0" anchor="t">
-            <a:normAutofit lnSpcReduction="10000"/>
-          </a:bodyPr>
-          <a:lstStyle/>
-          <a:p>
-            <a:pPr>
+              <a:rPr kumimoji="0" lang="de-DE" altLang="de-DE" sz="1800" b="1" i="0" u="none" strike="noStrike" cap="none" normalizeH="0" baseline="0" dirty="0">
+                <a:ln>
+                  <a:noFill/>
+                </a:ln>
+                <a:solidFill>
+                  <a:schemeClr val="tx1"/>
+                </a:solidFill>
+                <a:effectLst/>
+                <a:latin typeface="+mj-lt"/>
+              </a:rPr>
+              <a:t>Projektziel erreicht:</a:t>
+            </a:r>
+            <a:r>
+              <a:rPr kumimoji="0" lang="de-DE" altLang="de-DE" sz="1800" b="0" i="0" u="none" strike="noStrike" cap="none" normalizeH="0" baseline="0" dirty="0">
+                <a:ln>
+                  <a:noFill/>
+                </a:ln>
+                <a:solidFill>
+                  <a:schemeClr val="tx1"/>
+                </a:solidFill>
+                <a:effectLst/>
+                <a:latin typeface="+mj-lt"/>
+              </a:rPr>
+              <a:t> </a:t>
+            </a:r>
+            <a:r>
+              <a:rPr kumimoji="0" lang="de-DE" altLang="de-DE" sz="1800" b="0" i="0" u="none" strike="noStrike" cap="none" normalizeH="0" baseline="0" dirty="0">
+                <a:ln>
+                  <a:noFill/>
+                </a:ln>
+                <a:solidFill>
+                  <a:schemeClr val="tx1"/>
+                </a:solidFill>
+                <a:effectLst/>
+              </a:rPr>
+              <a:t>Alle User Storys erfolgreich umgesetzt</a:t>
+            </a:r>
+          </a:p>
+          <a:p>
+            <a:pPr marL="0" marR="0" lvl="0" indent="0" algn="l" defTabSz="914400" rtl="0" eaLnBrk="0" fontAlgn="base" latinLnBrk="0" hangingPunct="0">
+              <a:lnSpc>
+                <a:spcPct val="100000"/>
+              </a:lnSpc>
               <a:spcBef>
-                <a:spcPct val="20000"/>
+                <a:spcPct val="0"/>
               </a:spcBef>
               <a:spcAft>
-                <a:spcPts val="600"/>
+                <a:spcPct val="0"/>
               </a:spcAft>
-              <a:buClr>
+              <a:buClrTx/>
+              <a:buSzTx/>
+              <a:tabLst/>
+            </a:pPr>
+            <a:endParaRPr kumimoji="0" lang="de-DE" altLang="de-DE" sz="1800" b="0" i="0" u="none" strike="noStrike" cap="none" normalizeH="0" baseline="0" dirty="0">
+              <a:ln>
+                <a:noFill/>
+              </a:ln>
+              <a:solidFill>
                 <a:schemeClr val="tx1"/>
-              </a:buClr>
-              <a:buSzPct val="80000"/>
-            </a:pPr>
-            <a:r>
-              <a:rPr lang="de-DE" sz="2100" b="1" noProof="0" dirty="0"/>
-              <a:t>Docker:</a:t>
-            </a:r>
-          </a:p>
-          <a:p>
-            <a:pPr>
+              </a:solidFill>
+              <a:effectLst/>
+              <a:latin typeface="Arial" panose="020B0604020202020204" pitchFamily="34" charset="0"/>
+            </a:endParaRPr>
+          </a:p>
+          <a:p>
+            <a:pPr marL="0" marR="0" lvl="0" indent="0" algn="l" defTabSz="914400" rtl="0" eaLnBrk="0" fontAlgn="base" latinLnBrk="0" hangingPunct="0">
+              <a:lnSpc>
+                <a:spcPct val="100000"/>
+              </a:lnSpc>
               <a:spcBef>
-                <a:spcPct val="20000"/>
+                <a:spcPct val="0"/>
               </a:spcBef>
               <a:spcAft>
-                <a:spcPts val="600"/>
+                <a:spcPct val="0"/>
               </a:spcAft>
-              <a:buClr>
-                <a:schemeClr val="tx1"/>
-              </a:buClr>
-              <a:buSzPct val="80000"/>
+              <a:buClrTx/>
+              <a:buSzTx/>
+              <a:tabLst/>
             </a:pPr>
             <a:r>
-              <a:rPr lang="de-DE" sz="1700" dirty="0"/>
-              <a:t>Aufsetzen eines Containers</a:t>
-            </a:r>
-            <a:endParaRPr lang="de-DE" sz="1700" noProof="0" dirty="0"/>
-          </a:p>
-          <a:p>
-            <a:pPr>
+              <a:rPr kumimoji="0" lang="de-DE" altLang="de-DE" sz="1800" b="1" i="0" u="none" strike="noStrike" cap="none" normalizeH="0" baseline="0" dirty="0">
+                <a:ln>
+                  <a:noFill/>
+                </a:ln>
+                <a:solidFill>
+                  <a:schemeClr val="tx1"/>
+                </a:solidFill>
+                <a:effectLst/>
+                <a:latin typeface="+mj-lt"/>
+              </a:rPr>
+              <a:t>Technik:</a:t>
+            </a:r>
+            <a:endParaRPr lang="de-DE" altLang="de-DE" dirty="0">
+              <a:latin typeface="+mj-lt"/>
+            </a:endParaRPr>
+          </a:p>
+          <a:p>
+            <a:pPr marL="742950" lvl="1" indent="-285750" defTabSz="914400" eaLnBrk="0" fontAlgn="base" hangingPunct="0">
               <a:spcBef>
-                <a:spcPct val="20000"/>
+                <a:spcPct val="0"/>
               </a:spcBef>
               <a:spcAft>
-                <a:spcPts val="600"/>
+                <a:spcPct val="0"/>
               </a:spcAft>
-              <a:buClr>
-                <a:schemeClr val="tx1"/>
-              </a:buClr>
-              <a:buSzPct val="80000"/>
+              <a:buFont typeface="Arial" panose="020B0604020202020204" pitchFamily="34" charset="0"/>
+              <a:buChar char="•"/>
             </a:pPr>
-            <a:endParaRPr lang="de-DE" sz="2100" b="1" dirty="0"/>
-          </a:p>
-          <a:p>
-            <a:pPr>
+            <a:r>
+              <a:rPr kumimoji="0" lang="de-DE" altLang="de-DE" b="0" i="0" u="none" strike="noStrike" cap="none" normalizeH="0" baseline="0" dirty="0">
+                <a:ln>
+                  <a:noFill/>
+                </a:ln>
+                <a:solidFill>
+                  <a:schemeClr val="tx1"/>
+                </a:solidFill>
+                <a:effectLst/>
+              </a:rPr>
+              <a:t>Docker erleichterte Setup und </a:t>
+            </a:r>
+            <a:r>
+              <a:rPr kumimoji="0" lang="de-DE" altLang="de-DE" b="0" i="0" u="none" strike="noStrike" cap="none" normalizeH="0" baseline="0" dirty="0" err="1">
+                <a:ln>
+                  <a:noFill/>
+                </a:ln>
+                <a:solidFill>
+                  <a:schemeClr val="tx1"/>
+                </a:solidFill>
+                <a:effectLst/>
+              </a:rPr>
+              <a:t>Deployment</a:t>
+            </a:r>
+            <a:endParaRPr lang="de-DE" altLang="de-DE" dirty="0"/>
+          </a:p>
+          <a:p>
+            <a:pPr marL="742950" lvl="1" indent="-285750" defTabSz="914400" eaLnBrk="0" fontAlgn="base" hangingPunct="0">
               <a:spcBef>
-                <a:spcPct val="20000"/>
+                <a:spcPct val="0"/>
               </a:spcBef>
               <a:spcAft>
-                <a:spcPts val="600"/>
+                <a:spcPct val="0"/>
               </a:spcAft>
-              <a:buClr>
+              <a:buFont typeface="Arial" panose="020B0604020202020204" pitchFamily="34" charset="0"/>
+              <a:buChar char="•"/>
+            </a:pPr>
+            <a:r>
+              <a:rPr kumimoji="0" lang="de-DE" altLang="de-DE" sz="1800" b="0" i="0" u="none" strike="noStrike" cap="none" normalizeH="0" baseline="0" dirty="0">
+                <a:ln>
+                  <a:noFill/>
+                </a:ln>
+                <a:solidFill>
+                  <a:schemeClr val="tx1"/>
+                </a:solidFill>
+                <a:effectLst/>
+              </a:rPr>
+              <a:t>Erste Erfahrungen mit dem Zusammenspiel von Docker und </a:t>
+            </a:r>
+            <a:r>
+              <a:rPr kumimoji="0" lang="de-DE" altLang="de-DE" sz="1800" b="0" i="0" u="none" strike="noStrike" cap="none" normalizeH="0" baseline="0" dirty="0" err="1">
+                <a:ln>
+                  <a:noFill/>
+                </a:ln>
+                <a:solidFill>
+                  <a:schemeClr val="tx1"/>
+                </a:solidFill>
+                <a:effectLst/>
+              </a:rPr>
+              <a:t>Nginx</a:t>
+            </a:r>
+            <a:endParaRPr kumimoji="0" lang="de-DE" altLang="de-DE" sz="1800" b="0" i="0" u="none" strike="noStrike" cap="none" normalizeH="0" baseline="0" dirty="0">
+              <a:ln>
+                <a:noFill/>
+              </a:ln>
+              <a:solidFill>
                 <a:schemeClr val="tx1"/>
-              </a:buClr>
-              <a:buSzPct val="80000"/>
-            </a:pPr>
-            <a:r>
-              <a:rPr lang="de-DE" sz="2100" b="1" noProof="0" dirty="0" err="1"/>
-              <a:t>Nginx</a:t>
-            </a:r>
-            <a:r>
-              <a:rPr lang="de-DE" sz="2100" b="1" noProof="0" dirty="0"/>
-              <a:t>:</a:t>
-            </a:r>
-          </a:p>
-          <a:p>
-            <a:pPr>
+              </a:solidFill>
+              <a:effectLst/>
+            </a:endParaRPr>
+          </a:p>
+          <a:p>
+            <a:pPr marL="742950" lvl="1" indent="-285750" defTabSz="914400" eaLnBrk="0" fontAlgn="base" hangingPunct="0">
               <a:spcBef>
-                <a:spcPct val="20000"/>
+                <a:spcPct val="0"/>
               </a:spcBef>
               <a:spcAft>
-                <a:spcPts val="600"/>
+                <a:spcPct val="0"/>
               </a:spcAft>
-              <a:buClr>
-                <a:schemeClr val="tx1"/>
-              </a:buClr>
-              <a:buSzPct val="80000"/>
+              <a:buFont typeface="Arial" panose="020B0604020202020204" pitchFamily="34" charset="0"/>
+              <a:buChar char="•"/>
             </a:pPr>
             <a:r>
-              <a:rPr lang="de-DE" sz="1600" noProof="0" dirty="0" err="1"/>
-              <a:t>Konfig</a:t>
-            </a:r>
-            <a:r>
-              <a:rPr lang="de-DE" sz="1600" noProof="0" dirty="0"/>
-              <a:t> und Umsetzen von Server</a:t>
-            </a:r>
-          </a:p>
-          <a:p>
-            <a:pPr>
+              <a:rPr lang="de-DE" dirty="0" err="1"/>
+              <a:t>Nginx</a:t>
+            </a:r>
+            <a:r>
+              <a:rPr lang="de-DE" dirty="0"/>
+              <a:t> stabil für die Serverkonfiguration</a:t>
+            </a:r>
+          </a:p>
+          <a:p>
+            <a:pPr defTabSz="914400" eaLnBrk="0" fontAlgn="base" hangingPunct="0">
               <a:spcBef>
-                <a:spcPct val="20000"/>
+                <a:spcPct val="0"/>
               </a:spcBef>
               <a:spcAft>
-                <a:spcPts val="600"/>
+                <a:spcPct val="0"/>
               </a:spcAft>
-              <a:buClr>
+            </a:pPr>
+            <a:endParaRPr kumimoji="0" lang="de-DE" altLang="de-DE" b="1" i="0" u="none" strike="noStrike" cap="none" normalizeH="0" baseline="0" dirty="0">
+              <a:ln>
+                <a:noFill/>
+              </a:ln>
+              <a:solidFill>
                 <a:schemeClr val="tx1"/>
-              </a:buClr>
-              <a:buSzPct val="80000"/>
-            </a:pPr>
-            <a:endParaRPr lang="de-DE" sz="1600" dirty="0"/>
-          </a:p>
-          <a:p>
-            <a:pPr>
+              </a:solidFill>
+              <a:effectLst/>
+              <a:latin typeface="Arial" panose="020B0604020202020204" pitchFamily="34" charset="0"/>
+            </a:endParaRPr>
+          </a:p>
+          <a:p>
+            <a:pPr defTabSz="914400" eaLnBrk="0" fontAlgn="base" hangingPunct="0">
               <a:spcBef>
-                <a:spcPct val="20000"/>
+                <a:spcPct val="0"/>
               </a:spcBef>
               <a:spcAft>
-                <a:spcPts val="600"/>
+                <a:spcPct val="0"/>
               </a:spcAft>
-              <a:buClr>
-                <a:schemeClr val="tx1"/>
-              </a:buClr>
-              <a:buSzPct val="80000"/>
             </a:pPr>
             <a:r>
-              <a:rPr lang="de-DE" sz="1600" noProof="0" dirty="0"/>
-              <a:t>Frontend / HTML / JavaScript / CSS</a:t>
-            </a:r>
-          </a:p>
-          <a:p>
-            <a:pPr>
+              <a:rPr kumimoji="0" lang="de-DE" altLang="de-DE" b="1" i="0" u="none" strike="noStrike" cap="none" normalizeH="0" baseline="0" dirty="0">
+                <a:ln>
+                  <a:noFill/>
+                </a:ln>
+                <a:solidFill>
+                  <a:schemeClr val="tx1"/>
+                </a:solidFill>
+                <a:effectLst/>
+                <a:latin typeface="+mj-lt"/>
+              </a:rPr>
+              <a:t>Teamarbeit:</a:t>
+            </a:r>
+            <a:endParaRPr lang="de-DE" altLang="de-DE" dirty="0">
+              <a:latin typeface="+mj-lt"/>
+            </a:endParaRPr>
+          </a:p>
+          <a:p>
+            <a:pPr marL="742950" lvl="1" indent="-285750" defTabSz="914400" eaLnBrk="0" fontAlgn="base" hangingPunct="0">
               <a:spcBef>
-                <a:spcPct val="20000"/>
+                <a:spcPct val="0"/>
               </a:spcBef>
               <a:spcAft>
-                <a:spcPts val="600"/>
+                <a:spcPct val="0"/>
               </a:spcAft>
-              <a:buClr>
-                <a:schemeClr val="tx1"/>
-              </a:buClr>
-              <a:buSzPct val="80000"/>
+              <a:buFont typeface="Arial" panose="020B0604020202020204" pitchFamily="34" charset="0"/>
+              <a:buChar char="•"/>
             </a:pPr>
-            <a:endParaRPr lang="de-DE" sz="1600" noProof="0" dirty="0"/>
-          </a:p>
-          <a:p>
-            <a:pPr>
+            <a:r>
+              <a:rPr kumimoji="0" lang="de-DE" altLang="de-DE" b="0" i="0" u="none" strike="noStrike" cap="none" normalizeH="0" baseline="0" dirty="0">
+                <a:ln>
+                  <a:noFill/>
+                </a:ln>
+                <a:solidFill>
+                  <a:schemeClr val="tx1"/>
+                </a:solidFill>
+                <a:effectLst/>
+              </a:rPr>
+              <a:t>Erfolgreiche Integration der einzelnen Projektkomponenten</a:t>
+            </a:r>
+          </a:p>
+          <a:p>
+            <a:pPr lvl="1" defTabSz="914400" eaLnBrk="0" fontAlgn="base" hangingPunct="0">
               <a:spcBef>
-                <a:spcPct val="20000"/>
+                <a:spcPct val="0"/>
               </a:spcBef>
               <a:spcAft>
-                <a:spcPts val="600"/>
+                <a:spcPct val="0"/>
               </a:spcAft>
-              <a:buClr>
+            </a:pPr>
+            <a:endParaRPr kumimoji="0" lang="de-DE" altLang="de-DE" b="0" i="0" u="none" strike="noStrike" cap="none" normalizeH="0" baseline="0" dirty="0">
+              <a:ln>
+                <a:noFill/>
+              </a:ln>
+              <a:solidFill>
                 <a:schemeClr val="tx1"/>
-              </a:buClr>
-              <a:buSzPct val="80000"/>
-            </a:pPr>
-            <a:r>
-              <a:rPr lang="de-DE" sz="2400" b="1" dirty="0"/>
-              <a:t>Team:</a:t>
-            </a:r>
-          </a:p>
-          <a:p>
-            <a:pPr>
+              </a:solidFill>
+              <a:effectLst/>
+              <a:latin typeface="Arial" panose="020B0604020202020204" pitchFamily="34" charset="0"/>
+            </a:endParaRPr>
+          </a:p>
+          <a:p>
+            <a:pPr defTabSz="914400" eaLnBrk="0" fontAlgn="base" hangingPunct="0">
               <a:spcBef>
-                <a:spcPct val="20000"/>
+                <a:spcPct val="0"/>
               </a:spcBef>
               <a:spcAft>
-                <a:spcPts val="600"/>
+                <a:spcPct val="0"/>
               </a:spcAft>
-              <a:buClr>
-                <a:schemeClr val="tx1"/>
-              </a:buClr>
-              <a:buSzPct val="80000"/>
             </a:pPr>
             <a:r>
-              <a:rPr lang="de-DE" sz="1600" noProof="0" dirty="0"/>
-              <a:t>Absprache</a:t>
-            </a:r>
-          </a:p>
-          <a:p>
-            <a:pPr>
+              <a:rPr lang="de-DE" altLang="de-DE" b="1" dirty="0">
+                <a:latin typeface="+mj-lt"/>
+              </a:rPr>
+              <a:t>Erkenntnisse:</a:t>
+            </a:r>
+            <a:endParaRPr lang="de-DE" altLang="de-DE" dirty="0">
+              <a:latin typeface="+mj-lt"/>
+            </a:endParaRPr>
+          </a:p>
+          <a:p>
+            <a:pPr marL="742950" lvl="1" indent="-285750" defTabSz="914400" eaLnBrk="0" fontAlgn="base" hangingPunct="0">
               <a:spcBef>
-                <a:spcPct val="20000"/>
+                <a:spcPct val="0"/>
               </a:spcBef>
               <a:spcAft>
-                <a:spcPts val="600"/>
+                <a:spcPct val="0"/>
               </a:spcAft>
-              <a:buClr>
-                <a:schemeClr val="tx1"/>
-              </a:buClr>
-              <a:buSzPct val="80000"/>
+              <a:buFont typeface="Arial" panose="020B0604020202020204" pitchFamily="34" charset="0"/>
+              <a:buChar char="•"/>
             </a:pPr>
             <a:r>
-              <a:rPr lang="de-DE" sz="1600" noProof="0"/>
-              <a:t>Aufsetzen einer </a:t>
-            </a:r>
-            <a:r>
-              <a:rPr lang="de-DE" sz="1600" noProof="0" dirty="0"/>
-              <a:t>Datenbank.</a:t>
-            </a:r>
-          </a:p>
-          <a:p>
-            <a:pPr>
+              <a:rPr kumimoji="0" lang="de-DE" altLang="de-DE" i="0" u="none" strike="noStrike" cap="none" normalizeH="0" baseline="0" dirty="0">
+                <a:ln>
+                  <a:noFill/>
+                </a:ln>
+                <a:solidFill>
+                  <a:schemeClr val="tx1"/>
+                </a:solidFill>
+                <a:effectLst/>
+              </a:rPr>
+              <a:t>Frühzeitige Abstimmung und Integration reduzieren spätere Probleme</a:t>
+            </a:r>
+          </a:p>
+          <a:p>
+            <a:pPr marL="742950" lvl="1" indent="-285750" defTabSz="914400" eaLnBrk="0" fontAlgn="base" hangingPunct="0">
               <a:spcBef>
-                <a:spcPct val="20000"/>
+                <a:spcPct val="0"/>
               </a:spcBef>
               <a:spcAft>
-                <a:spcPts val="600"/>
+                <a:spcPct val="0"/>
               </a:spcAft>
-              <a:buClr>
+              <a:buFont typeface="Arial" panose="020B0604020202020204" pitchFamily="34" charset="0"/>
+              <a:buChar char="•"/>
+            </a:pPr>
+            <a:r>
+              <a:rPr kumimoji="0" lang="de-DE" altLang="de-DE" i="0" u="none" strike="noStrike" cap="none" normalizeH="0" baseline="0" dirty="0">
+                <a:ln>
+                  <a:noFill/>
+                </a:ln>
+                <a:solidFill>
+                  <a:schemeClr val="tx1"/>
+                </a:solidFill>
+                <a:effectLst/>
+              </a:rPr>
+              <a:t>Klare Aufgabenverteilung verbessert die Effizienz</a:t>
+            </a:r>
+          </a:p>
+          <a:p>
+            <a:pPr marL="0" marR="0" lvl="0" indent="0" algn="l" defTabSz="914400" rtl="0" eaLnBrk="0" fontAlgn="base" latinLnBrk="0" hangingPunct="0">
+              <a:lnSpc>
+                <a:spcPct val="100000"/>
+              </a:lnSpc>
+              <a:spcBef>
+                <a:spcPct val="0"/>
+              </a:spcBef>
+              <a:spcAft>
+                <a:spcPct val="0"/>
+              </a:spcAft>
+              <a:buClrTx/>
+              <a:buSzTx/>
+              <a:tabLst/>
+            </a:pPr>
+            <a:endParaRPr kumimoji="0" lang="de-DE" altLang="de-DE" sz="1800" b="1" i="0" u="none" strike="noStrike" cap="none" normalizeH="0" baseline="0" dirty="0">
+              <a:ln>
+                <a:noFill/>
+              </a:ln>
+              <a:solidFill>
                 <a:schemeClr val="tx1"/>
-              </a:buClr>
-              <a:buSzPct val="80000"/>
+              </a:solidFill>
+              <a:effectLst/>
+              <a:latin typeface="Arial" panose="020B0604020202020204" pitchFamily="34" charset="0"/>
+            </a:endParaRPr>
+          </a:p>
+          <a:p>
+            <a:pPr marL="0" marR="0" lvl="0" indent="0" algn="l" defTabSz="914400" rtl="0" eaLnBrk="0" fontAlgn="base" latinLnBrk="0" hangingPunct="0">
+              <a:lnSpc>
+                <a:spcPct val="100000"/>
+              </a:lnSpc>
+              <a:spcBef>
+                <a:spcPct val="0"/>
+              </a:spcBef>
+              <a:spcAft>
+                <a:spcPct val="0"/>
+              </a:spcAft>
+              <a:buClrTx/>
+              <a:buSzTx/>
+              <a:tabLst/>
             </a:pPr>
-            <a:endParaRPr lang="de-DE" sz="2100" b="1" noProof="0" dirty="0"/>
+            <a:r>
+              <a:rPr kumimoji="0" lang="de-DE" altLang="de-DE" sz="1800" b="1" i="0" u="none" strike="noStrike" cap="none" normalizeH="0" baseline="0" dirty="0">
+                <a:ln>
+                  <a:noFill/>
+                </a:ln>
+                <a:solidFill>
+                  <a:schemeClr val="tx1"/>
+                </a:solidFill>
+                <a:effectLst/>
+                <a:latin typeface="+mj-lt"/>
+              </a:rPr>
+              <a:t>Zukunftsfähigkeit:</a:t>
+            </a:r>
+            <a:endParaRPr lang="de-DE" altLang="de-DE" dirty="0">
+              <a:latin typeface="+mj-lt"/>
+            </a:endParaRPr>
+          </a:p>
+          <a:p>
+            <a:pPr marL="742950" lvl="1" indent="-285750" defTabSz="914400" eaLnBrk="0" fontAlgn="base" hangingPunct="0">
+              <a:spcBef>
+                <a:spcPct val="0"/>
+              </a:spcBef>
+              <a:spcAft>
+                <a:spcPct val="0"/>
+              </a:spcAft>
+              <a:buFont typeface="Arial" panose="020B0604020202020204" pitchFamily="34" charset="0"/>
+              <a:buChar char="•"/>
+            </a:pPr>
+            <a:r>
+              <a:rPr kumimoji="0" lang="de-DE" altLang="de-DE" b="0" i="0" u="none" strike="noStrike" cap="none" normalizeH="0" baseline="0" dirty="0">
+                <a:ln>
+                  <a:noFill/>
+                </a:ln>
+                <a:solidFill>
+                  <a:schemeClr val="tx1"/>
+                </a:solidFill>
+                <a:effectLst/>
+              </a:rPr>
+              <a:t>Derzeitige Umsetzung hat Potenzial für den Realbetrieb</a:t>
+            </a:r>
           </a:p>
         </p:txBody>
       </p:sp>

</xml_diff>